<commit_message>
Adding decision tree diagram
</commit_message>
<xml_diff>
--- a/Images/decision_tree.pptx
+++ b/Images/decision_tree.pptx
@@ -6,6 +6,7 @@
   </p:sldMasterIdLst>
   <p:sldIdLst>
     <p:sldId id="256" r:id="rId2"/>
+    <p:sldId id="257" r:id="rId3"/>
   </p:sldIdLst>
   <p:sldSz cx="12192000" cy="6858000"/>
   <p:notesSz cx="6858000" cy="9144000"/>
@@ -104,6 +105,11 @@
       </a:defRPr>
     </a:lvl9pPr>
   </p:defaultTextStyle>
+  <p:extLst>
+    <p:ext uri="{EFAFB233-063F-42B5-8137-9DF3F51BA10A}">
+      <p15:sldGuideLst xmlns:p15="http://schemas.microsoft.com/office/powerpoint/2012/main"/>
+    </p:ext>
+  </p:extLst>
 </p:presentation>
 </file>
 
@@ -4222,6 +4228,1011 @@
 </p:sld>
 </file>
 
+<file path=ppt/slides/slide2.xml><?xml version="1.0" encoding="utf-8"?>
+<p:sld xmlns:a="http://schemas.openxmlformats.org/drawingml/2006/main" xmlns:r="http://schemas.openxmlformats.org/officeDocument/2006/relationships" xmlns:p="http://schemas.openxmlformats.org/presentationml/2006/main">
+  <p:cSld>
+    <p:spTree>
+      <p:nvGrpSpPr>
+        <p:cNvPr id="1" name=""/>
+        <p:cNvGrpSpPr/>
+        <p:nvPr/>
+      </p:nvGrpSpPr>
+      <p:grpSpPr>
+        <a:xfrm>
+          <a:off x="0" y="0"/>
+          <a:ext cx="0" cy="0"/>
+          <a:chOff x="0" y="0"/>
+          <a:chExt cx="0" cy="0"/>
+        </a:xfrm>
+      </p:grpSpPr>
+      <p:sp>
+        <p:nvSpPr>
+          <p:cNvPr id="4" name="Rectangle: Rounded Corners 3">
+            <a:extLst>
+              <a:ext uri="{FF2B5EF4-FFF2-40B4-BE49-F238E27FC236}">
+                <a16:creationId xmlns:a16="http://schemas.microsoft.com/office/drawing/2014/main" id="{A778F7EF-00F0-BA53-025E-032CDE3504FF}"/>
+              </a:ext>
+            </a:extLst>
+          </p:cNvPr>
+          <p:cNvSpPr/>
+          <p:nvPr/>
+        </p:nvSpPr>
+        <p:spPr>
+          <a:xfrm>
+            <a:off x="4996873" y="674255"/>
+            <a:ext cx="1662545" cy="637309"/>
+          </a:xfrm>
+          <a:prstGeom prst="roundRect">
+            <a:avLst/>
+          </a:prstGeom>
+        </p:spPr>
+        <p:style>
+          <a:lnRef idx="2">
+            <a:schemeClr val="accent2">
+              <a:shade val="50000"/>
+            </a:schemeClr>
+          </a:lnRef>
+          <a:fillRef idx="1">
+            <a:schemeClr val="accent2"/>
+          </a:fillRef>
+          <a:effectRef idx="0">
+            <a:schemeClr val="accent2"/>
+          </a:effectRef>
+          <a:fontRef idx="minor">
+            <a:schemeClr val="lt1"/>
+          </a:fontRef>
+        </p:style>
+        <p:txBody>
+          <a:bodyPr rtlCol="0" anchor="ctr"/>
+          <a:lstStyle/>
+          <a:p>
+            <a:pPr algn="ctr"/>
+            <a:r>
+              <a:rPr lang="en-GB" dirty="0"/>
+              <a:t>Weather</a:t>
+            </a:r>
+          </a:p>
+        </p:txBody>
+      </p:sp>
+      <p:sp>
+        <p:nvSpPr>
+          <p:cNvPr id="6" name="Rectangle: Rounded Corners 5">
+            <a:extLst>
+              <a:ext uri="{FF2B5EF4-FFF2-40B4-BE49-F238E27FC236}">
+                <a16:creationId xmlns:a16="http://schemas.microsoft.com/office/drawing/2014/main" id="{32FFE7A2-BD44-C873-B74E-FD48BB6C1333}"/>
+              </a:ext>
+            </a:extLst>
+          </p:cNvPr>
+          <p:cNvSpPr/>
+          <p:nvPr/>
+        </p:nvSpPr>
+        <p:spPr>
+          <a:xfrm>
+            <a:off x="2350916" y="2333403"/>
+            <a:ext cx="1662545" cy="637309"/>
+          </a:xfrm>
+          <a:prstGeom prst="roundRect">
+            <a:avLst/>
+          </a:prstGeom>
+        </p:spPr>
+        <p:style>
+          <a:lnRef idx="2">
+            <a:schemeClr val="accent4">
+              <a:shade val="50000"/>
+            </a:schemeClr>
+          </a:lnRef>
+          <a:fillRef idx="1">
+            <a:schemeClr val="accent4"/>
+          </a:fillRef>
+          <a:effectRef idx="0">
+            <a:schemeClr val="accent4"/>
+          </a:effectRef>
+          <a:fontRef idx="minor">
+            <a:schemeClr val="lt1"/>
+          </a:fontRef>
+        </p:style>
+        <p:txBody>
+          <a:bodyPr rtlCol="0" anchor="ctr"/>
+          <a:lstStyle/>
+          <a:p>
+            <a:pPr algn="ctr"/>
+            <a:r>
+              <a:rPr lang="en-GB" dirty="0"/>
+              <a:t>Humidity</a:t>
+            </a:r>
+          </a:p>
+        </p:txBody>
+      </p:sp>
+      <p:sp>
+        <p:nvSpPr>
+          <p:cNvPr id="7" name="Rectangle: Rounded Corners 6">
+            <a:extLst>
+              <a:ext uri="{FF2B5EF4-FFF2-40B4-BE49-F238E27FC236}">
+                <a16:creationId xmlns:a16="http://schemas.microsoft.com/office/drawing/2014/main" id="{35C22A55-8829-EF49-9057-EE048F9BEDBC}"/>
+              </a:ext>
+            </a:extLst>
+          </p:cNvPr>
+          <p:cNvSpPr/>
+          <p:nvPr/>
+        </p:nvSpPr>
+        <p:spPr>
+          <a:xfrm>
+            <a:off x="1461436" y="4236610"/>
+            <a:ext cx="1662545" cy="637309"/>
+          </a:xfrm>
+          <a:prstGeom prst="roundRect">
+            <a:avLst/>
+          </a:prstGeom>
+        </p:spPr>
+        <p:style>
+          <a:lnRef idx="2">
+            <a:schemeClr val="accent3">
+              <a:shade val="50000"/>
+            </a:schemeClr>
+          </a:lnRef>
+          <a:fillRef idx="1">
+            <a:schemeClr val="accent3"/>
+          </a:fillRef>
+          <a:effectRef idx="0">
+            <a:schemeClr val="accent3"/>
+          </a:effectRef>
+          <a:fontRef idx="minor">
+            <a:schemeClr val="lt1"/>
+          </a:fontRef>
+        </p:style>
+        <p:txBody>
+          <a:bodyPr rtlCol="0" anchor="ctr"/>
+          <a:lstStyle/>
+          <a:p>
+            <a:pPr algn="ctr"/>
+            <a:r>
+              <a:rPr lang="en-GB" dirty="0"/>
+              <a:t>Do Not Go Outside</a:t>
+            </a:r>
+          </a:p>
+        </p:txBody>
+      </p:sp>
+      <p:sp>
+        <p:nvSpPr>
+          <p:cNvPr id="8" name="Rectangle: Rounded Corners 7">
+            <a:extLst>
+              <a:ext uri="{FF2B5EF4-FFF2-40B4-BE49-F238E27FC236}">
+                <a16:creationId xmlns:a16="http://schemas.microsoft.com/office/drawing/2014/main" id="{695AF7D3-86B9-CE99-021D-287E297643F3}"/>
+              </a:ext>
+            </a:extLst>
+          </p:cNvPr>
+          <p:cNvSpPr/>
+          <p:nvPr/>
+        </p:nvSpPr>
+        <p:spPr>
+          <a:xfrm>
+            <a:off x="3294118" y="4249551"/>
+            <a:ext cx="1662545" cy="637309"/>
+          </a:xfrm>
+          <a:prstGeom prst="roundRect">
+            <a:avLst/>
+          </a:prstGeom>
+        </p:spPr>
+        <p:style>
+          <a:lnRef idx="2">
+            <a:schemeClr val="accent3">
+              <a:shade val="50000"/>
+            </a:schemeClr>
+          </a:lnRef>
+          <a:fillRef idx="1">
+            <a:schemeClr val="accent3"/>
+          </a:fillRef>
+          <a:effectRef idx="0">
+            <a:schemeClr val="accent3"/>
+          </a:effectRef>
+          <a:fontRef idx="minor">
+            <a:schemeClr val="lt1"/>
+          </a:fontRef>
+        </p:style>
+        <p:txBody>
+          <a:bodyPr rtlCol="0" anchor="ctr"/>
+          <a:lstStyle/>
+          <a:p>
+            <a:pPr algn="ctr"/>
+            <a:r>
+              <a:rPr lang="en-GB" dirty="0"/>
+              <a:t>Go Outside</a:t>
+            </a:r>
+          </a:p>
+        </p:txBody>
+      </p:sp>
+      <p:cxnSp>
+        <p:nvCxnSpPr>
+          <p:cNvPr id="11" name="Straight Arrow Connector 10">
+            <a:extLst>
+              <a:ext uri="{FF2B5EF4-FFF2-40B4-BE49-F238E27FC236}">
+                <a16:creationId xmlns:a16="http://schemas.microsoft.com/office/drawing/2014/main" id="{FEB9A0D5-C023-3DAC-972D-88C667E7D552}"/>
+              </a:ext>
+            </a:extLst>
+          </p:cNvPr>
+          <p:cNvCxnSpPr>
+            <a:cxnSpLocks/>
+            <a:stCxn id="4" idx="2"/>
+            <a:endCxn id="6" idx="0"/>
+          </p:cNvCxnSpPr>
+          <p:nvPr/>
+        </p:nvCxnSpPr>
+        <p:spPr>
+          <a:xfrm flipH="1">
+            <a:off x="3182189" y="1311564"/>
+            <a:ext cx="2645957" cy="1021839"/>
+          </a:xfrm>
+          <a:prstGeom prst="straightConnector1">
+            <a:avLst/>
+          </a:prstGeom>
+          <a:ln>
+            <a:tailEnd type="triangle"/>
+          </a:ln>
+        </p:spPr>
+        <p:style>
+          <a:lnRef idx="1">
+            <a:schemeClr val="dk1"/>
+          </a:lnRef>
+          <a:fillRef idx="0">
+            <a:schemeClr val="dk1"/>
+          </a:fillRef>
+          <a:effectRef idx="0">
+            <a:schemeClr val="dk1"/>
+          </a:effectRef>
+          <a:fontRef idx="minor">
+            <a:schemeClr val="tx1"/>
+          </a:fontRef>
+        </p:style>
+      </p:cxnSp>
+      <p:sp>
+        <p:nvSpPr>
+          <p:cNvPr id="12" name="Rectangle: Rounded Corners 11">
+            <a:extLst>
+              <a:ext uri="{FF2B5EF4-FFF2-40B4-BE49-F238E27FC236}">
+                <a16:creationId xmlns:a16="http://schemas.microsoft.com/office/drawing/2014/main" id="{27AE4955-A844-F84C-88F2-5036B52338CC}"/>
+              </a:ext>
+            </a:extLst>
+          </p:cNvPr>
+          <p:cNvSpPr/>
+          <p:nvPr/>
+        </p:nvSpPr>
+        <p:spPr>
+          <a:xfrm>
+            <a:off x="7508687" y="2333403"/>
+            <a:ext cx="1662545" cy="637309"/>
+          </a:xfrm>
+          <a:prstGeom prst="roundRect">
+            <a:avLst/>
+          </a:prstGeom>
+        </p:spPr>
+        <p:style>
+          <a:lnRef idx="2">
+            <a:schemeClr val="accent4">
+              <a:shade val="50000"/>
+            </a:schemeClr>
+          </a:lnRef>
+          <a:fillRef idx="1">
+            <a:schemeClr val="accent4"/>
+          </a:fillRef>
+          <a:effectRef idx="0">
+            <a:schemeClr val="accent4"/>
+          </a:effectRef>
+          <a:fontRef idx="minor">
+            <a:schemeClr val="lt1"/>
+          </a:fontRef>
+        </p:style>
+        <p:txBody>
+          <a:bodyPr rtlCol="0" anchor="ctr"/>
+          <a:lstStyle/>
+          <a:p>
+            <a:pPr algn="ctr"/>
+            <a:r>
+              <a:rPr lang="en-GB" dirty="0"/>
+              <a:t>Wind</a:t>
+            </a:r>
+          </a:p>
+        </p:txBody>
+      </p:sp>
+      <p:cxnSp>
+        <p:nvCxnSpPr>
+          <p:cNvPr id="13" name="Straight Arrow Connector 12">
+            <a:extLst>
+              <a:ext uri="{FF2B5EF4-FFF2-40B4-BE49-F238E27FC236}">
+                <a16:creationId xmlns:a16="http://schemas.microsoft.com/office/drawing/2014/main" id="{D107FAB7-7149-A922-4F72-7810D37708D5}"/>
+              </a:ext>
+            </a:extLst>
+          </p:cNvPr>
+          <p:cNvCxnSpPr>
+            <a:cxnSpLocks/>
+            <a:stCxn id="4" idx="2"/>
+            <a:endCxn id="12" idx="0"/>
+          </p:cNvCxnSpPr>
+          <p:nvPr/>
+        </p:nvCxnSpPr>
+        <p:spPr>
+          <a:xfrm>
+            <a:off x="5828146" y="1311564"/>
+            <a:ext cx="2511814" cy="1021839"/>
+          </a:xfrm>
+          <a:prstGeom prst="straightConnector1">
+            <a:avLst/>
+          </a:prstGeom>
+          <a:ln>
+            <a:tailEnd type="triangle"/>
+          </a:ln>
+        </p:spPr>
+        <p:style>
+          <a:lnRef idx="1">
+            <a:schemeClr val="dk1"/>
+          </a:lnRef>
+          <a:fillRef idx="0">
+            <a:schemeClr val="dk1"/>
+          </a:fillRef>
+          <a:effectRef idx="0">
+            <a:schemeClr val="dk1"/>
+          </a:effectRef>
+          <a:fontRef idx="minor">
+            <a:schemeClr val="tx1"/>
+          </a:fontRef>
+        </p:style>
+      </p:cxnSp>
+      <p:cxnSp>
+        <p:nvCxnSpPr>
+          <p:cNvPr id="16" name="Straight Arrow Connector 15">
+            <a:extLst>
+              <a:ext uri="{FF2B5EF4-FFF2-40B4-BE49-F238E27FC236}">
+                <a16:creationId xmlns:a16="http://schemas.microsoft.com/office/drawing/2014/main" id="{55D65B65-F040-184A-533C-B222030F8667}"/>
+              </a:ext>
+            </a:extLst>
+          </p:cNvPr>
+          <p:cNvCxnSpPr>
+            <a:cxnSpLocks/>
+            <a:stCxn id="6" idx="2"/>
+            <a:endCxn id="7" idx="0"/>
+          </p:cNvCxnSpPr>
+          <p:nvPr/>
+        </p:nvCxnSpPr>
+        <p:spPr>
+          <a:xfrm flipH="1">
+            <a:off x="2292709" y="2970712"/>
+            <a:ext cx="889480" cy="1265898"/>
+          </a:xfrm>
+          <a:prstGeom prst="straightConnector1">
+            <a:avLst/>
+          </a:prstGeom>
+          <a:ln>
+            <a:tailEnd type="triangle"/>
+          </a:ln>
+        </p:spPr>
+        <p:style>
+          <a:lnRef idx="1">
+            <a:schemeClr val="dk1"/>
+          </a:lnRef>
+          <a:fillRef idx="0">
+            <a:schemeClr val="dk1"/>
+          </a:fillRef>
+          <a:effectRef idx="0">
+            <a:schemeClr val="dk1"/>
+          </a:effectRef>
+          <a:fontRef idx="minor">
+            <a:schemeClr val="tx1"/>
+          </a:fontRef>
+        </p:style>
+      </p:cxnSp>
+      <p:cxnSp>
+        <p:nvCxnSpPr>
+          <p:cNvPr id="20" name="Straight Arrow Connector 19">
+            <a:extLst>
+              <a:ext uri="{FF2B5EF4-FFF2-40B4-BE49-F238E27FC236}">
+                <a16:creationId xmlns:a16="http://schemas.microsoft.com/office/drawing/2014/main" id="{F297C4D9-6A2C-BC9F-6648-E49ADBEF5227}"/>
+              </a:ext>
+            </a:extLst>
+          </p:cNvPr>
+          <p:cNvCxnSpPr>
+            <a:stCxn id="6" idx="2"/>
+            <a:endCxn id="8" idx="0"/>
+          </p:cNvCxnSpPr>
+          <p:nvPr/>
+        </p:nvCxnSpPr>
+        <p:spPr>
+          <a:xfrm>
+            <a:off x="3182189" y="2970712"/>
+            <a:ext cx="943202" cy="1278839"/>
+          </a:xfrm>
+          <a:prstGeom prst="straightConnector1">
+            <a:avLst/>
+          </a:prstGeom>
+          <a:ln>
+            <a:tailEnd type="triangle"/>
+          </a:ln>
+        </p:spPr>
+        <p:style>
+          <a:lnRef idx="1">
+            <a:schemeClr val="dk1"/>
+          </a:lnRef>
+          <a:fillRef idx="0">
+            <a:schemeClr val="dk1"/>
+          </a:fillRef>
+          <a:effectRef idx="0">
+            <a:schemeClr val="dk1"/>
+          </a:effectRef>
+          <a:fontRef idx="minor">
+            <a:schemeClr val="tx1"/>
+          </a:fontRef>
+        </p:style>
+      </p:cxnSp>
+      <p:sp>
+        <p:nvSpPr>
+          <p:cNvPr id="29" name="Rectangle: Rounded Corners 28">
+            <a:extLst>
+              <a:ext uri="{FF2B5EF4-FFF2-40B4-BE49-F238E27FC236}">
+                <a16:creationId xmlns:a16="http://schemas.microsoft.com/office/drawing/2014/main" id="{6F826157-127F-50DE-261F-F3CCBD3445D4}"/>
+              </a:ext>
+            </a:extLst>
+          </p:cNvPr>
+          <p:cNvSpPr/>
+          <p:nvPr/>
+        </p:nvSpPr>
+        <p:spPr>
+          <a:xfrm>
+            <a:off x="6633991" y="4259218"/>
+            <a:ext cx="1662545" cy="637309"/>
+          </a:xfrm>
+          <a:prstGeom prst="roundRect">
+            <a:avLst/>
+          </a:prstGeom>
+        </p:spPr>
+        <p:style>
+          <a:lnRef idx="2">
+            <a:schemeClr val="accent3">
+              <a:shade val="50000"/>
+            </a:schemeClr>
+          </a:lnRef>
+          <a:fillRef idx="1">
+            <a:schemeClr val="accent3"/>
+          </a:fillRef>
+          <a:effectRef idx="0">
+            <a:schemeClr val="accent3"/>
+          </a:effectRef>
+          <a:fontRef idx="minor">
+            <a:schemeClr val="lt1"/>
+          </a:fontRef>
+        </p:style>
+        <p:txBody>
+          <a:bodyPr rtlCol="0" anchor="ctr"/>
+          <a:lstStyle/>
+          <a:p>
+            <a:pPr algn="ctr"/>
+            <a:r>
+              <a:rPr lang="en-GB" dirty="0"/>
+              <a:t>Do Not Go Outside</a:t>
+            </a:r>
+          </a:p>
+        </p:txBody>
+      </p:sp>
+      <p:sp>
+        <p:nvSpPr>
+          <p:cNvPr id="30" name="Rectangle: Rounded Corners 29">
+            <a:extLst>
+              <a:ext uri="{FF2B5EF4-FFF2-40B4-BE49-F238E27FC236}">
+                <a16:creationId xmlns:a16="http://schemas.microsoft.com/office/drawing/2014/main" id="{FFCFDFFF-5903-8805-8247-90C8A31A2172}"/>
+              </a:ext>
+            </a:extLst>
+          </p:cNvPr>
+          <p:cNvSpPr/>
+          <p:nvPr/>
+        </p:nvSpPr>
+        <p:spPr>
+          <a:xfrm>
+            <a:off x="8470239" y="4259218"/>
+            <a:ext cx="1662545" cy="637309"/>
+          </a:xfrm>
+          <a:prstGeom prst="roundRect">
+            <a:avLst/>
+          </a:prstGeom>
+        </p:spPr>
+        <p:style>
+          <a:lnRef idx="2">
+            <a:schemeClr val="accent3">
+              <a:shade val="50000"/>
+            </a:schemeClr>
+          </a:lnRef>
+          <a:fillRef idx="1">
+            <a:schemeClr val="accent3"/>
+          </a:fillRef>
+          <a:effectRef idx="0">
+            <a:schemeClr val="accent3"/>
+          </a:effectRef>
+          <a:fontRef idx="minor">
+            <a:schemeClr val="lt1"/>
+          </a:fontRef>
+        </p:style>
+        <p:txBody>
+          <a:bodyPr rtlCol="0" anchor="ctr"/>
+          <a:lstStyle/>
+          <a:p>
+            <a:pPr algn="ctr"/>
+            <a:r>
+              <a:rPr lang="en-GB" dirty="0"/>
+              <a:t>Go Outside</a:t>
+            </a:r>
+          </a:p>
+        </p:txBody>
+      </p:sp>
+      <p:cxnSp>
+        <p:nvCxnSpPr>
+          <p:cNvPr id="34" name="Straight Arrow Connector 33">
+            <a:extLst>
+              <a:ext uri="{FF2B5EF4-FFF2-40B4-BE49-F238E27FC236}">
+                <a16:creationId xmlns:a16="http://schemas.microsoft.com/office/drawing/2014/main" id="{497CD8E0-80B3-06A9-8C2A-267AD194334E}"/>
+              </a:ext>
+            </a:extLst>
+          </p:cNvPr>
+          <p:cNvCxnSpPr>
+            <a:stCxn id="12" idx="2"/>
+            <a:endCxn id="29" idx="0"/>
+          </p:cNvCxnSpPr>
+          <p:nvPr/>
+        </p:nvCxnSpPr>
+        <p:spPr>
+          <a:xfrm flipH="1">
+            <a:off x="7465264" y="2970712"/>
+            <a:ext cx="874696" cy="1288506"/>
+          </a:xfrm>
+          <a:prstGeom prst="straightConnector1">
+            <a:avLst/>
+          </a:prstGeom>
+          <a:ln>
+            <a:tailEnd type="triangle"/>
+          </a:ln>
+        </p:spPr>
+        <p:style>
+          <a:lnRef idx="1">
+            <a:schemeClr val="dk1"/>
+          </a:lnRef>
+          <a:fillRef idx="0">
+            <a:schemeClr val="dk1"/>
+          </a:fillRef>
+          <a:effectRef idx="0">
+            <a:schemeClr val="dk1"/>
+          </a:effectRef>
+          <a:fontRef idx="minor">
+            <a:schemeClr val="tx1"/>
+          </a:fontRef>
+        </p:style>
+      </p:cxnSp>
+      <p:cxnSp>
+        <p:nvCxnSpPr>
+          <p:cNvPr id="36" name="Straight Arrow Connector 35">
+            <a:extLst>
+              <a:ext uri="{FF2B5EF4-FFF2-40B4-BE49-F238E27FC236}">
+                <a16:creationId xmlns:a16="http://schemas.microsoft.com/office/drawing/2014/main" id="{6674F4D5-E753-DDF0-1131-2AA3B2DEDBE9}"/>
+              </a:ext>
+            </a:extLst>
+          </p:cNvPr>
+          <p:cNvCxnSpPr>
+            <a:stCxn id="12" idx="2"/>
+            <a:endCxn id="30" idx="0"/>
+          </p:cNvCxnSpPr>
+          <p:nvPr/>
+        </p:nvCxnSpPr>
+        <p:spPr>
+          <a:xfrm>
+            <a:off x="8339960" y="2970712"/>
+            <a:ext cx="961552" cy="1288506"/>
+          </a:xfrm>
+          <a:prstGeom prst="straightConnector1">
+            <a:avLst/>
+          </a:prstGeom>
+          <a:ln>
+            <a:tailEnd type="triangle"/>
+          </a:ln>
+        </p:spPr>
+        <p:style>
+          <a:lnRef idx="1">
+            <a:schemeClr val="dk1"/>
+          </a:lnRef>
+          <a:fillRef idx="0">
+            <a:schemeClr val="dk1"/>
+          </a:fillRef>
+          <a:effectRef idx="0">
+            <a:schemeClr val="dk1"/>
+          </a:effectRef>
+          <a:fontRef idx="minor">
+            <a:schemeClr val="tx1"/>
+          </a:fontRef>
+        </p:style>
+      </p:cxnSp>
+      <p:sp>
+        <p:nvSpPr>
+          <p:cNvPr id="2" name="TextBox 1">
+            <a:extLst>
+              <a:ext uri="{FF2B5EF4-FFF2-40B4-BE49-F238E27FC236}">
+                <a16:creationId xmlns:a16="http://schemas.microsoft.com/office/drawing/2014/main" id="{D71D0C0C-272F-1DA8-07EB-7880E99D2B14}"/>
+              </a:ext>
+            </a:extLst>
+          </p:cNvPr>
+          <p:cNvSpPr txBox="1"/>
+          <p:nvPr/>
+        </p:nvSpPr>
+        <p:spPr>
+          <a:xfrm rot="20265155">
+            <a:off x="4033385" y="1502191"/>
+            <a:ext cx="755848" cy="369332"/>
+          </a:xfrm>
+          <a:prstGeom prst="rect">
+            <a:avLst/>
+          </a:prstGeom>
+          <a:noFill/>
+        </p:spPr>
+        <p:txBody>
+          <a:bodyPr wrap="none" rtlCol="0">
+            <a:spAutoFit/>
+          </a:bodyPr>
+          <a:lstStyle/>
+          <a:p>
+            <a:r>
+              <a:rPr lang="en-GB" dirty="0"/>
+              <a:t>Sunny</a:t>
+            </a:r>
+          </a:p>
+        </p:txBody>
+      </p:sp>
+      <p:sp>
+        <p:nvSpPr>
+          <p:cNvPr id="3" name="TextBox 2">
+            <a:extLst>
+              <a:ext uri="{FF2B5EF4-FFF2-40B4-BE49-F238E27FC236}">
+                <a16:creationId xmlns:a16="http://schemas.microsoft.com/office/drawing/2014/main" id="{F4F338EE-A1E2-7ECD-3522-816186B3CAE8}"/>
+              </a:ext>
+            </a:extLst>
+          </p:cNvPr>
+          <p:cNvSpPr txBox="1"/>
+          <p:nvPr/>
+        </p:nvSpPr>
+        <p:spPr>
+          <a:xfrm rot="1367545">
+            <a:off x="6977519" y="1510891"/>
+            <a:ext cx="694934" cy="369332"/>
+          </a:xfrm>
+          <a:prstGeom prst="rect">
+            <a:avLst/>
+          </a:prstGeom>
+          <a:noFill/>
+        </p:spPr>
+        <p:txBody>
+          <a:bodyPr wrap="none" rtlCol="0">
+            <a:spAutoFit/>
+          </a:bodyPr>
+          <a:lstStyle/>
+          <a:p>
+            <a:r>
+              <a:rPr lang="en-GB" dirty="0"/>
+              <a:t>Rainy</a:t>
+            </a:r>
+          </a:p>
+        </p:txBody>
+      </p:sp>
+      <p:sp>
+        <p:nvSpPr>
+          <p:cNvPr id="10" name="TextBox 9">
+            <a:extLst>
+              <a:ext uri="{FF2B5EF4-FFF2-40B4-BE49-F238E27FC236}">
+                <a16:creationId xmlns:a16="http://schemas.microsoft.com/office/drawing/2014/main" id="{8DD99B82-2BD4-EDFC-71F3-1DF040F419BC}"/>
+              </a:ext>
+            </a:extLst>
+          </p:cNvPr>
+          <p:cNvSpPr txBox="1"/>
+          <p:nvPr/>
+        </p:nvSpPr>
+        <p:spPr>
+          <a:xfrm rot="18194519">
+            <a:off x="2261781" y="3326827"/>
+            <a:ext cx="612668" cy="369332"/>
+          </a:xfrm>
+          <a:prstGeom prst="rect">
+            <a:avLst/>
+          </a:prstGeom>
+          <a:noFill/>
+        </p:spPr>
+        <p:txBody>
+          <a:bodyPr wrap="none" rtlCol="0">
+            <a:spAutoFit/>
+          </a:bodyPr>
+          <a:lstStyle/>
+          <a:p>
+            <a:r>
+              <a:rPr lang="en-GB" dirty="0"/>
+              <a:t>High</a:t>
+            </a:r>
+          </a:p>
+        </p:txBody>
+      </p:sp>
+      <p:sp>
+        <p:nvSpPr>
+          <p:cNvPr id="19" name="TextBox 18">
+            <a:extLst>
+              <a:ext uri="{FF2B5EF4-FFF2-40B4-BE49-F238E27FC236}">
+                <a16:creationId xmlns:a16="http://schemas.microsoft.com/office/drawing/2014/main" id="{D1D4580A-9939-4B09-0B60-5004030DDB8D}"/>
+              </a:ext>
+            </a:extLst>
+          </p:cNvPr>
+          <p:cNvSpPr txBox="1"/>
+          <p:nvPr/>
+        </p:nvSpPr>
+        <p:spPr>
+          <a:xfrm rot="3235487">
+            <a:off x="3422166" y="3410953"/>
+            <a:ext cx="883575" cy="369332"/>
+          </a:xfrm>
+          <a:prstGeom prst="rect">
+            <a:avLst/>
+          </a:prstGeom>
+          <a:noFill/>
+        </p:spPr>
+        <p:txBody>
+          <a:bodyPr wrap="none" rtlCol="0">
+            <a:spAutoFit/>
+          </a:bodyPr>
+          <a:lstStyle/>
+          <a:p>
+            <a:r>
+              <a:rPr lang="en-GB" dirty="0"/>
+              <a:t>Normal</a:t>
+            </a:r>
+          </a:p>
+        </p:txBody>
+      </p:sp>
+      <p:sp>
+        <p:nvSpPr>
+          <p:cNvPr id="21" name="TextBox 20">
+            <a:extLst>
+              <a:ext uri="{FF2B5EF4-FFF2-40B4-BE49-F238E27FC236}">
+                <a16:creationId xmlns:a16="http://schemas.microsoft.com/office/drawing/2014/main" id="{F1D9FB70-6C38-284A-17C1-8F366CF05F06}"/>
+              </a:ext>
+            </a:extLst>
+          </p:cNvPr>
+          <p:cNvSpPr txBox="1"/>
+          <p:nvPr/>
+        </p:nvSpPr>
+        <p:spPr>
+          <a:xfrm rot="18172867">
+            <a:off x="7251008" y="3470853"/>
+            <a:ext cx="796500" cy="369332"/>
+          </a:xfrm>
+          <a:prstGeom prst="rect">
+            <a:avLst/>
+          </a:prstGeom>
+          <a:noFill/>
+        </p:spPr>
+        <p:txBody>
+          <a:bodyPr wrap="none" rtlCol="0">
+            <a:spAutoFit/>
+          </a:bodyPr>
+          <a:lstStyle/>
+          <a:p>
+            <a:r>
+              <a:rPr lang="en-GB" dirty="0"/>
+              <a:t>Strong</a:t>
+            </a:r>
+          </a:p>
+        </p:txBody>
+      </p:sp>
+      <p:sp>
+        <p:nvSpPr>
+          <p:cNvPr id="23" name="TextBox 22">
+            <a:extLst>
+              <a:ext uri="{FF2B5EF4-FFF2-40B4-BE49-F238E27FC236}">
+                <a16:creationId xmlns:a16="http://schemas.microsoft.com/office/drawing/2014/main" id="{B0E8E7EE-446D-E8C3-2F92-E1E92D7DE7F1}"/>
+              </a:ext>
+            </a:extLst>
+          </p:cNvPr>
+          <p:cNvSpPr txBox="1"/>
+          <p:nvPr/>
+        </p:nvSpPr>
+        <p:spPr>
+          <a:xfrm rot="3271949">
+            <a:off x="8636933" y="3410953"/>
+            <a:ext cx="711605" cy="369332"/>
+          </a:xfrm>
+          <a:prstGeom prst="rect">
+            <a:avLst/>
+          </a:prstGeom>
+          <a:noFill/>
+        </p:spPr>
+        <p:txBody>
+          <a:bodyPr wrap="none" rtlCol="0">
+            <a:spAutoFit/>
+          </a:bodyPr>
+          <a:lstStyle/>
+          <a:p>
+            <a:r>
+              <a:rPr lang="en-GB" dirty="0"/>
+              <a:t>Weak</a:t>
+            </a:r>
+          </a:p>
+        </p:txBody>
+      </p:sp>
+      <p:cxnSp>
+        <p:nvCxnSpPr>
+          <p:cNvPr id="26" name="Straight Arrow Connector 25">
+            <a:extLst>
+              <a:ext uri="{FF2B5EF4-FFF2-40B4-BE49-F238E27FC236}">
+                <a16:creationId xmlns:a16="http://schemas.microsoft.com/office/drawing/2014/main" id="{0F9784A1-1D9C-4938-59B7-2297E43A65C8}"/>
+              </a:ext>
+            </a:extLst>
+          </p:cNvPr>
+          <p:cNvCxnSpPr>
+            <a:cxnSpLocks/>
+            <a:stCxn id="4" idx="2"/>
+          </p:cNvCxnSpPr>
+          <p:nvPr/>
+        </p:nvCxnSpPr>
+        <p:spPr>
+          <a:xfrm flipH="1">
+            <a:off x="5828145" y="1311564"/>
+            <a:ext cx="1" cy="510919"/>
+          </a:xfrm>
+          <a:prstGeom prst="straightConnector1">
+            <a:avLst/>
+          </a:prstGeom>
+          <a:ln>
+            <a:tailEnd type="triangle"/>
+          </a:ln>
+        </p:spPr>
+        <p:style>
+          <a:lnRef idx="1">
+            <a:schemeClr val="dk1"/>
+          </a:lnRef>
+          <a:fillRef idx="0">
+            <a:schemeClr val="dk1"/>
+          </a:fillRef>
+          <a:effectRef idx="0">
+            <a:schemeClr val="dk1"/>
+          </a:effectRef>
+          <a:fontRef idx="minor">
+            <a:schemeClr val="tx1"/>
+          </a:fontRef>
+        </p:style>
+      </p:cxnSp>
+      <p:sp>
+        <p:nvSpPr>
+          <p:cNvPr id="31" name="TextBox 30">
+            <a:extLst>
+              <a:ext uri="{FF2B5EF4-FFF2-40B4-BE49-F238E27FC236}">
+                <a16:creationId xmlns:a16="http://schemas.microsoft.com/office/drawing/2014/main" id="{CC21CC7D-1B40-383D-EEAE-52498867B24D}"/>
+              </a:ext>
+            </a:extLst>
+          </p:cNvPr>
+          <p:cNvSpPr txBox="1"/>
+          <p:nvPr/>
+        </p:nvSpPr>
+        <p:spPr>
+          <a:xfrm>
+            <a:off x="5443197" y="1819190"/>
+            <a:ext cx="830677" cy="369332"/>
+          </a:xfrm>
+          <a:prstGeom prst="rect">
+            <a:avLst/>
+          </a:prstGeom>
+          <a:noFill/>
+        </p:spPr>
+        <p:txBody>
+          <a:bodyPr wrap="none" rtlCol="0">
+            <a:spAutoFit/>
+          </a:bodyPr>
+          <a:lstStyle/>
+          <a:p>
+            <a:r>
+              <a:rPr lang="en-GB" dirty="0"/>
+              <a:t>Cloudy</a:t>
+            </a:r>
+          </a:p>
+        </p:txBody>
+      </p:sp>
+      <p:sp>
+        <p:nvSpPr>
+          <p:cNvPr id="32" name="Rectangle: Rounded Corners 31">
+            <a:extLst>
+              <a:ext uri="{FF2B5EF4-FFF2-40B4-BE49-F238E27FC236}">
+                <a16:creationId xmlns:a16="http://schemas.microsoft.com/office/drawing/2014/main" id="{81935F53-3FCC-E295-7E6E-DB419A2E13AE}"/>
+              </a:ext>
+            </a:extLst>
+          </p:cNvPr>
+          <p:cNvSpPr/>
+          <p:nvPr/>
+        </p:nvSpPr>
+        <p:spPr>
+          <a:xfrm>
+            <a:off x="5026258" y="2696148"/>
+            <a:ext cx="1662545" cy="637309"/>
+          </a:xfrm>
+          <a:prstGeom prst="roundRect">
+            <a:avLst/>
+          </a:prstGeom>
+        </p:spPr>
+        <p:style>
+          <a:lnRef idx="2">
+            <a:schemeClr val="accent3">
+              <a:shade val="50000"/>
+            </a:schemeClr>
+          </a:lnRef>
+          <a:fillRef idx="1">
+            <a:schemeClr val="accent3"/>
+          </a:fillRef>
+          <a:effectRef idx="0">
+            <a:schemeClr val="accent3"/>
+          </a:effectRef>
+          <a:fontRef idx="minor">
+            <a:schemeClr val="lt1"/>
+          </a:fontRef>
+        </p:style>
+        <p:txBody>
+          <a:bodyPr rtlCol="0" anchor="ctr"/>
+          <a:lstStyle/>
+          <a:p>
+            <a:pPr algn="ctr"/>
+            <a:r>
+              <a:rPr lang="en-GB" dirty="0"/>
+              <a:t>Go Outside</a:t>
+            </a:r>
+          </a:p>
+        </p:txBody>
+      </p:sp>
+      <p:cxnSp>
+        <p:nvCxnSpPr>
+          <p:cNvPr id="39" name="Straight Arrow Connector 38">
+            <a:extLst>
+              <a:ext uri="{FF2B5EF4-FFF2-40B4-BE49-F238E27FC236}">
+                <a16:creationId xmlns:a16="http://schemas.microsoft.com/office/drawing/2014/main" id="{0359AFD4-1386-77BE-C583-26C92340CE36}"/>
+              </a:ext>
+            </a:extLst>
+          </p:cNvPr>
+          <p:cNvCxnSpPr>
+            <a:cxnSpLocks/>
+          </p:cNvCxnSpPr>
+          <p:nvPr/>
+        </p:nvCxnSpPr>
+        <p:spPr>
+          <a:xfrm flipH="1">
+            <a:off x="5828144" y="2173624"/>
+            <a:ext cx="1" cy="510919"/>
+          </a:xfrm>
+          <a:prstGeom prst="straightConnector1">
+            <a:avLst/>
+          </a:prstGeom>
+          <a:ln>
+            <a:tailEnd type="triangle"/>
+          </a:ln>
+        </p:spPr>
+        <p:style>
+          <a:lnRef idx="1">
+            <a:schemeClr val="dk1"/>
+          </a:lnRef>
+          <a:fillRef idx="0">
+            <a:schemeClr val="dk1"/>
+          </a:fillRef>
+          <a:effectRef idx="0">
+            <a:schemeClr val="dk1"/>
+          </a:effectRef>
+          <a:fontRef idx="minor">
+            <a:schemeClr val="tx1"/>
+          </a:fontRef>
+        </p:style>
+      </p:cxnSp>
+    </p:spTree>
+    <p:extLst>
+      <p:ext uri="{BB962C8B-B14F-4D97-AF65-F5344CB8AC3E}">
+        <p14:creationId xmlns:p14="http://schemas.microsoft.com/office/powerpoint/2010/main" val="3086019947"/>
+      </p:ext>
+    </p:extLst>
+  </p:cSld>
+  <p:clrMapOvr>
+    <a:masterClrMapping/>
+  </p:clrMapOvr>
+</p:sld>
+</file>
+
 <file path=ppt/theme/theme1.xml><?xml version="1.0" encoding="utf-8"?>
 <a:theme xmlns:a="http://schemas.openxmlformats.org/drawingml/2006/main" name="Office Theme">
   <a:themeElements>

</xml_diff>